<commit_message>
Refactoring: New templates for the new formatter in templates, no longer in Excel
</commit_message>
<xml_diff>
--- a/data/mock_data/template_presentation.pptx
+++ b/data/mock_data/template_presentation.pptx
@@ -7,6 +7,7 @@
   <p:sldIdLst>
     <p:sldId id="256" r:id="rId7"/>
     <p:sldId id="257" r:id="rId8"/>
+    <p:sldId id="258" r:id="rId9"/>
   </p:sldIdLst>
   <p:sldSz cx="9144000" cy="6858000" type="screen4x3"/>
   <p:notesSz cx="6858000" cy="9144000"/>
@@ -3105,7 +3106,7 @@
           <a:lstStyle/>
           <a:p>
             <a:r>
-              <a:t>Proposal for {{ client_name }}</a:t>
+              <a:t>Client Overview: {{ client_name | format_string('title') }}</a:t>
             </a:r>
           </a:p>
         </p:txBody>
@@ -3126,7 +3127,7 @@
           <a:lstStyle/>
           <a:p>
             <a:r>
-              <a:t>Value: {{ contract_value }} | Date: {{ start_date }}</a:t>
+              <a:t>Generated on: {{ contract_date | format_date('medium') }}</a:t>
             </a:r>
           </a:p>
         </p:txBody>
@@ -3165,7 +3166,7 @@
           <a:lstStyle/>
           <a:p>
             <a:r>
-              <a:t>Risk Assessment</a:t>
+              <a:t>Financial &amp; Status Highlights</a:t>
             </a:r>
           </a:p>
         </p:txBody>
@@ -3186,41 +3187,85 @@
           <a:lstStyle/>
           <a:p>
             <a:r>
-              <a:t>Current Risk Status: {{ risk_level }}</a:t>
+              <a:t>Key Metrics:</a:t>
             </a:r>
           </a:p>
           <a:p>
             <a:pPr lvl="1"/>
             <a:r>
-              <a:t>Tax ID Reference: {{ tax_id }}</a:t>
-            </a:r>
-          </a:p>
-        </p:txBody>
-      </p:sp>
-      <p:sp>
-        <p:nvSpPr>
-          <p:cNvPr id="4" name="TextBox 3"/>
-          <p:cNvSpPr txBox="1"/>
-          <p:nvPr/>
-        </p:nvSpPr>
-        <p:spPr>
-          <a:xfrm>
-            <a:off x="457200" y="6400800"/>
-            <a:ext cx="8229600" cy="457200"/>
-          </a:xfrm>
-          <a:prstGeom prst="rect">
-            <a:avLst/>
-          </a:prstGeom>
-          <a:noFill/>
-        </p:spPr>
-        <p:txBody>
-          <a:bodyPr wrap="none">
-            <a:spAutoFit/>
-          </a:bodyPr>
-          <a:lstStyle/>
-          <a:p>
-            <a:r>
-              <a:t>Confidential - DocGenius Generated</a:t>
+              <a:t>Contract Value (BRL): {{ contract_value | format_currency('BRL') }}</a:t>
+            </a:r>
+          </a:p>
+          <a:p>
+            <a:pPr lvl="1"/>
+            <a:r>
+              <a:t>Current Status: {{ status_code | format_logic('10=Green (Go)', '20=Yellow (Hold)', 'Red (Stop)') }}</a:t>
+            </a:r>
+          </a:p>
+        </p:txBody>
+      </p:sp>
+    </p:spTree>
+  </p:cSld>
+  <p:clrMapOvr>
+    <a:masterClrMapping/>
+  </p:clrMapOvr>
+</p:sld>
+</file>
+
+<file path=ppt/slides/slide3.xml><?xml version="1.0" encoding="utf-8"?>
+<p:sld xmlns:a="http://schemas.openxmlformats.org/drawingml/2006/main" xmlns:p="http://schemas.openxmlformats.org/presentationml/2006/main" xmlns:r="http://schemas.openxmlformats.org/officeDocument/2006/relationships">
+  <p:cSld>
+    <p:spTree>
+      <p:nvGrpSpPr>
+        <p:cNvPr id="1" name=""/>
+        <p:cNvGrpSpPr/>
+        <p:nvPr/>
+      </p:nvGrpSpPr>
+      <p:grpSpPr/>
+      <p:sp>
+        <p:nvSpPr>
+          <p:cNvPr id="2" name="Title 1"/>
+          <p:cNvSpPr>
+            <a:spLocks noGrp="1"/>
+          </p:cNvSpPr>
+          <p:nvPr>
+            <p:ph type="title"/>
+          </p:nvPr>
+        </p:nvSpPr>
+        <p:spPr/>
+        <p:txBody>
+          <a:bodyPr/>
+          <a:lstStyle/>
+          <a:p>
+            <a:r>
+              <a:t>Audit Checkpoints (Boolean Formats)</a:t>
+            </a:r>
+          </a:p>
+        </p:txBody>
+      </p:sp>
+      <p:sp>
+        <p:nvSpPr>
+          <p:cNvPr id="3" name="Content Placeholder 2"/>
+          <p:cNvSpPr>
+            <a:spLocks noGrp="1"/>
+          </p:cNvSpPr>
+          <p:nvPr>
+            <p:ph idx="1"/>
+          </p:nvPr>
+        </p:nvSpPr>
+        <p:spPr/>
+        <p:txBody>
+          <a:bodyPr/>
+          <a:lstStyle/>
+          <a:p/>
+          <a:p>
+            <a:r>
+              <a:t>Is Active User? -&gt; {{ is_active | format_bool('truefalse') }}</a:t>
+            </a:r>
+          </a:p>
+          <a:p>
+            <a:r>
+              <a:t>Debt Clearance Checkbox: [ {{ has_debt | format_bool('checkbox') }} ]</a:t>
             </a:r>
           </a:p>
         </p:txBody>

</xml_diff>

<commit_message>
New templates for exhaustive testing
</commit_message>
<xml_diff>
--- a/data/mock_data/template_presentation.pptx
+++ b/data/mock_data/template_presentation.pptx
@@ -7,7 +7,6 @@
   <p:sldIdLst>
     <p:sldId id="256" r:id="rId7"/>
     <p:sldId id="257" r:id="rId8"/>
-    <p:sldId id="258" r:id="rId9"/>
   </p:sldIdLst>
   <p:sldSz cx="9144000" cy="6858000" type="screen4x3"/>
   <p:notesSz cx="6858000" cy="9144000"/>
@@ -3106,7 +3105,7 @@
           <a:lstStyle/>
           <a:p>
             <a:r>
-              <a:t>Client Overview: {{ client_name | format_string('title') }}</a:t>
+              <a:t>{{ company | format_string('upper') }}</a:t>
             </a:r>
           </a:p>
         </p:txBody>
@@ -3127,7 +3126,7 @@
           <a:lstStyle/>
           <a:p>
             <a:r>
-              <a:t>Generated on: {{ contract_date | format_date('medium') }}</a:t>
+              <a:t>Strategic Review | {{ founded_date | format_date('year') }}</a:t>
             </a:r>
           </a:p>
         </p:txBody>
@@ -3166,7 +3165,7 @@
           <a:lstStyle/>
           <a:p>
             <a:r>
-              <a:t>Financial &amp; Status Highlights</a:t>
+              <a:t>Financial Scorecard</a:t>
             </a:r>
           </a:p>
         </p:txBody>
@@ -3185,87 +3184,29 @@
         <p:txBody>
           <a:bodyPr/>
           <a:lstStyle/>
-          <a:p>
-            <a:r>
-              <a:t>Key Metrics:</a:t>
-            </a:r>
-          </a:p>
-          <a:p>
-            <a:pPr lvl="1"/>
-            <a:r>
-              <a:t>Contract Value (BRL): {{ contract_value | format_currency('BRL') }}</a:t>
-            </a:r>
-          </a:p>
-          <a:p>
-            <a:pPr lvl="1"/>
-            <a:r>
-              <a:t>Current Status: {{ status_code | format_logic('10=Green (Go)', '20=Yellow (Hold)', 'Red (Stop)') }}</a:t>
-            </a:r>
-          </a:p>
-        </p:txBody>
-      </p:sp>
-    </p:spTree>
-  </p:cSld>
-  <p:clrMapOvr>
-    <a:masterClrMapping/>
-  </p:clrMapOvr>
-</p:sld>
-</file>
-
-<file path=ppt/slides/slide3.xml><?xml version="1.0" encoding="utf-8"?>
-<p:sld xmlns:a="http://schemas.openxmlformats.org/drawingml/2006/main" xmlns:p="http://schemas.openxmlformats.org/presentationml/2006/main" xmlns:r="http://schemas.openxmlformats.org/officeDocument/2006/relationships">
-  <p:cSld>
-    <p:spTree>
-      <p:nvGrpSpPr>
-        <p:cNvPr id="1" name=""/>
-        <p:cNvGrpSpPr/>
-        <p:nvPr/>
-      </p:nvGrpSpPr>
-      <p:grpSpPr/>
-      <p:sp>
-        <p:nvSpPr>
-          <p:cNvPr id="2" name="Title 1"/>
-          <p:cNvSpPr>
-            <a:spLocks noGrp="1"/>
-          </p:cNvSpPr>
-          <p:nvPr>
-            <p:ph type="title"/>
-          </p:nvPr>
-        </p:nvSpPr>
-        <p:spPr/>
-        <p:txBody>
-          <a:bodyPr/>
-          <a:lstStyle/>
-          <a:p>
-            <a:r>
-              <a:t>Audit Checkpoints (Boolean Formats)</a:t>
-            </a:r>
-          </a:p>
-        </p:txBody>
-      </p:sp>
-      <p:sp>
-        <p:nvSpPr>
-          <p:cNvPr id="3" name="Content Placeholder 2"/>
-          <p:cNvSpPr>
-            <a:spLocks noGrp="1"/>
-          </p:cNvSpPr>
-          <p:nvPr>
-            <p:ph idx="1"/>
-          </p:nvPr>
-        </p:nvSpPr>
-        <p:spPr/>
-        <p:txBody>
-          <a:bodyPr/>
-          <a:lstStyle/>
           <a:p/>
           <a:p>
-            <a:r>
-              <a:t>Is Active User? -&gt; {{ is_active | format_bool('truefalse') }}</a:t>
-            </a:r>
-          </a:p>
-          <a:p>
-            <a:r>
-              <a:t>Debt Clearance Checkbox: [ {{ has_debt | format_bool('checkbox') }} ]</a:t>
+            <a:pPr>
+              <a:defRPr sz="2400"/>
+            </a:pPr>
+            <a:r>
+              <a:t>Q4 Revenue: {{ revenue_q4 | format_currency('USD') }}</a:t>
+            </a:r>
+          </a:p>
+          <a:p>
+            <a:pPr>
+              <a:defRPr sz="2400"/>
+            </a:pPr>
+            <a:r>
+              <a:t>Growth: {{ growth_pct | format_number('percent', '2') }}</a:t>
+            </a:r>
+          </a:p>
+          <a:p>
+            <a:pPr>
+              <a:defRPr b="1"/>
+            </a:pPr>
+            <a:r>
+              <a:t>Risk Level: {{ risk_score | format_logic('10=LOW (Green)', '20=MED (Yellow)', '30=HIGH (Red)', 'default', 'UNRATED') }}</a:t>
             </a:r>
           </a:p>
         </p:txBody>

</xml_diff>

<commit_message>
feat: full synchronization of formatting strategies, documentation and templates
</commit_message>
<xml_diff>
--- a/data/mock_data/template_presentation.pptx
+++ b/data/mock_data/template_presentation.pptx
@@ -5,8 +5,10 @@
     <p:sldMasterId id="2147483648" r:id="rId1"/>
   </p:sldMasterIdLst>
   <p:sldIdLst>
-    <p:sldId id="256" r:id="rId7"/>
-    <p:sldId id="257" r:id="rId8"/>
+    <p:sldId id="256" r:id="rId2"/>
+    <p:sldId id="257" r:id="rId3"/>
+    <p:sldId id="259" r:id="rId4"/>
+    <p:sldId id="260" r:id="rId5"/>
   </p:sldIdLst>
   <p:sldSz cx="9144000" cy="6858000" type="screen4x3"/>
   <p:notesSz cx="6858000" cy="9144000"/>
@@ -105,6 +107,22 @@
       </a:defRPr>
     </a:lvl9pPr>
   </p:defaultTextStyle>
+  <p:extLst>
+    <p:ext uri="{EFAFB233-063F-42B5-8137-9DF3F51BA10A}">
+      <p15:sldGuideLst xmlns:p15="http://schemas.microsoft.com/office/powerpoint/2012/main">
+        <p15:guide id="1" orient="horz" pos="2160">
+          <p15:clr>
+            <a:srgbClr val="A4A3A4"/>
+          </p15:clr>
+        </p15:guide>
+        <p15:guide id="2" pos="2880">
+          <p15:clr>
+            <a:srgbClr val="A4A3A4"/>
+          </p15:clr>
+        </p15:guide>
+      </p15:sldGuideLst>
+    </p:ext>
+  </p:extLst>
 </p:presentation>
 </file>
 
@@ -146,10 +164,9 @@
           <a:lstStyle/>
           <a:p>
             <a:r>
-              <a:rPr lang="en-US" smtClean="0"/>
+              <a:rPr lang="en-US"/>
               <a:t>Click to edit Master title style</a:t>
             </a:r>
-            <a:endParaRPr lang="en-US"/>
           </a:p>
         </p:txBody>
       </p:sp>
@@ -265,10 +282,9 @@
           </a:lstStyle>
           <a:p>
             <a:r>
-              <a:rPr lang="en-US" smtClean="0"/>
+              <a:rPr lang="en-US"/>
               <a:t>Click to edit Master subtitle style</a:t>
             </a:r>
-            <a:endParaRPr lang="en-US"/>
           </a:p>
         </p:txBody>
       </p:sp>
@@ -289,7 +305,7 @@
           <a:p>
             <a:fld id="{5BCAD085-E8A6-8845-BD4E-CB4CCA059FC4}" type="datetimeFigureOut">
               <a:rPr lang="en-US" smtClean="0"/>
-              <a:t>1/27/13</a:t>
+              <a:t>1/24/2026</a:t>
             </a:fld>
             <a:endParaRPr lang="en-US"/>
           </a:p>
@@ -331,7 +347,7 @@
           <a:p>
             <a:fld id="{C1FF6DA9-008F-8B48-92A6-B652298478BF}" type="slidenum">
               <a:rPr lang="en-US" smtClean="0"/>
-              <a:t>‹#›</a:t>
+              <a:t>‹nº›</a:t>
             </a:fld>
             <a:endParaRPr lang="en-US"/>
           </a:p>
@@ -383,10 +399,9 @@
           <a:lstStyle/>
           <a:p>
             <a:r>
-              <a:rPr lang="en-US" smtClean="0"/>
+              <a:rPr lang="en-US"/>
               <a:t>Click to edit Master title style</a:t>
             </a:r>
-            <a:endParaRPr lang="en-US"/>
           </a:p>
         </p:txBody>
       </p:sp>
@@ -407,38 +422,37 @@
           <a:p>
             <a:pPr lvl="0"/>
             <a:r>
-              <a:rPr lang="en-US" smtClean="0"/>
+              <a:rPr lang="en-US"/>
               <a:t>Click to edit Master text styles</a:t>
             </a:r>
           </a:p>
           <a:p>
             <a:pPr lvl="1"/>
             <a:r>
-              <a:rPr lang="en-US" smtClean="0"/>
+              <a:rPr lang="en-US"/>
               <a:t>Second level</a:t>
             </a:r>
           </a:p>
           <a:p>
             <a:pPr lvl="2"/>
             <a:r>
-              <a:rPr lang="en-US" smtClean="0"/>
+              <a:rPr lang="en-US"/>
               <a:t>Third level</a:t>
             </a:r>
           </a:p>
           <a:p>
             <a:pPr lvl="3"/>
             <a:r>
-              <a:rPr lang="en-US" smtClean="0"/>
+              <a:rPr lang="en-US"/>
               <a:t>Fourth level</a:t>
             </a:r>
           </a:p>
           <a:p>
             <a:pPr lvl="4"/>
             <a:r>
-              <a:rPr lang="en-US" smtClean="0"/>
+              <a:rPr lang="en-US"/>
               <a:t>Fifth level</a:t>
             </a:r>
-            <a:endParaRPr lang="en-US"/>
           </a:p>
         </p:txBody>
       </p:sp>
@@ -459,7 +473,7 @@
           <a:p>
             <a:fld id="{5BCAD085-E8A6-8845-BD4E-CB4CCA059FC4}" type="datetimeFigureOut">
               <a:rPr lang="en-US" smtClean="0"/>
-              <a:t>1/27/13</a:t>
+              <a:t>1/24/2026</a:t>
             </a:fld>
             <a:endParaRPr lang="en-US"/>
           </a:p>
@@ -501,7 +515,7 @@
           <a:p>
             <a:fld id="{C1FF6DA9-008F-8B48-92A6-B652298478BF}" type="slidenum">
               <a:rPr lang="en-US" smtClean="0"/>
-              <a:t>‹#›</a:t>
+              <a:t>‹nº›</a:t>
             </a:fld>
             <a:endParaRPr lang="en-US"/>
           </a:p>
@@ -558,10 +572,9 @@
           <a:lstStyle/>
           <a:p>
             <a:r>
-              <a:rPr lang="en-US" smtClean="0"/>
+              <a:rPr lang="en-US"/>
               <a:t>Click to edit Master title style</a:t>
             </a:r>
-            <a:endParaRPr lang="en-US"/>
           </a:p>
         </p:txBody>
       </p:sp>
@@ -587,38 +600,37 @@
           <a:p>
             <a:pPr lvl="0"/>
             <a:r>
-              <a:rPr lang="en-US" smtClean="0"/>
+              <a:rPr lang="en-US"/>
               <a:t>Click to edit Master text styles</a:t>
             </a:r>
           </a:p>
           <a:p>
             <a:pPr lvl="1"/>
             <a:r>
-              <a:rPr lang="en-US" smtClean="0"/>
+              <a:rPr lang="en-US"/>
               <a:t>Second level</a:t>
             </a:r>
           </a:p>
           <a:p>
             <a:pPr lvl="2"/>
             <a:r>
-              <a:rPr lang="en-US" smtClean="0"/>
+              <a:rPr lang="en-US"/>
               <a:t>Third level</a:t>
             </a:r>
           </a:p>
           <a:p>
             <a:pPr lvl="3"/>
             <a:r>
-              <a:rPr lang="en-US" smtClean="0"/>
+              <a:rPr lang="en-US"/>
               <a:t>Fourth level</a:t>
             </a:r>
           </a:p>
           <a:p>
             <a:pPr lvl="4"/>
             <a:r>
-              <a:rPr lang="en-US" smtClean="0"/>
+              <a:rPr lang="en-US"/>
               <a:t>Fifth level</a:t>
             </a:r>
-            <a:endParaRPr lang="en-US"/>
           </a:p>
         </p:txBody>
       </p:sp>
@@ -639,7 +651,7 @@
           <a:p>
             <a:fld id="{5BCAD085-E8A6-8845-BD4E-CB4CCA059FC4}" type="datetimeFigureOut">
               <a:rPr lang="en-US" smtClean="0"/>
-              <a:t>1/27/13</a:t>
+              <a:t>1/24/2026</a:t>
             </a:fld>
             <a:endParaRPr lang="en-US"/>
           </a:p>
@@ -681,7 +693,7 @@
           <a:p>
             <a:fld id="{C1FF6DA9-008F-8B48-92A6-B652298478BF}" type="slidenum">
               <a:rPr lang="en-US" smtClean="0"/>
-              <a:t>‹#›</a:t>
+              <a:t>‹nº›</a:t>
             </a:fld>
             <a:endParaRPr lang="en-US"/>
           </a:p>
@@ -733,10 +745,9 @@
           <a:lstStyle/>
           <a:p>
             <a:r>
-              <a:rPr lang="en-US" smtClean="0"/>
+              <a:rPr lang="en-US"/>
               <a:t>Click to edit Master title style</a:t>
             </a:r>
-            <a:endParaRPr lang="en-US"/>
           </a:p>
         </p:txBody>
       </p:sp>
@@ -757,38 +768,37 @@
           <a:p>
             <a:pPr lvl="0"/>
             <a:r>
-              <a:rPr lang="en-US" smtClean="0"/>
+              <a:rPr lang="en-US"/>
               <a:t>Click to edit Master text styles</a:t>
             </a:r>
           </a:p>
           <a:p>
             <a:pPr lvl="1"/>
             <a:r>
-              <a:rPr lang="en-US" smtClean="0"/>
+              <a:rPr lang="en-US"/>
               <a:t>Second level</a:t>
             </a:r>
           </a:p>
           <a:p>
             <a:pPr lvl="2"/>
             <a:r>
-              <a:rPr lang="en-US" smtClean="0"/>
+              <a:rPr lang="en-US"/>
               <a:t>Third level</a:t>
             </a:r>
           </a:p>
           <a:p>
             <a:pPr lvl="3"/>
             <a:r>
-              <a:rPr lang="en-US" smtClean="0"/>
+              <a:rPr lang="en-US"/>
               <a:t>Fourth level</a:t>
             </a:r>
           </a:p>
           <a:p>
             <a:pPr lvl="4"/>
             <a:r>
-              <a:rPr lang="en-US" smtClean="0"/>
+              <a:rPr lang="en-US"/>
               <a:t>Fifth level</a:t>
             </a:r>
-            <a:endParaRPr lang="en-US"/>
           </a:p>
         </p:txBody>
       </p:sp>
@@ -809,7 +819,7 @@
           <a:p>
             <a:fld id="{5BCAD085-E8A6-8845-BD4E-CB4CCA059FC4}" type="datetimeFigureOut">
               <a:rPr lang="en-US" smtClean="0"/>
-              <a:t>1/27/13</a:t>
+              <a:t>1/24/2026</a:t>
             </a:fld>
             <a:endParaRPr lang="en-US"/>
           </a:p>
@@ -851,7 +861,7 @@
           <a:p>
             <a:fld id="{C1FF6DA9-008F-8B48-92A6-B652298478BF}" type="slidenum">
               <a:rPr lang="en-US" smtClean="0"/>
-              <a:t>‹#›</a:t>
+              <a:t>‹nº›</a:t>
             </a:fld>
             <a:endParaRPr lang="en-US"/>
           </a:p>
@@ -912,10 +922,9 @@
           </a:lstStyle>
           <a:p>
             <a:r>
-              <a:rPr lang="en-US" smtClean="0"/>
+              <a:rPr lang="en-US"/>
               <a:t>Click to edit Master title style</a:t>
             </a:r>
-            <a:endParaRPr lang="en-US"/>
           </a:p>
         </p:txBody>
       </p:sp>
@@ -1032,7 +1041,7 @@
           <a:p>
             <a:pPr lvl="0"/>
             <a:r>
-              <a:rPr lang="en-US" smtClean="0"/>
+              <a:rPr lang="en-US"/>
               <a:t>Click to edit Master text styles</a:t>
             </a:r>
           </a:p>
@@ -1055,7 +1064,7 @@
           <a:p>
             <a:fld id="{5BCAD085-E8A6-8845-BD4E-CB4CCA059FC4}" type="datetimeFigureOut">
               <a:rPr lang="en-US" smtClean="0"/>
-              <a:t>1/27/13</a:t>
+              <a:t>1/24/2026</a:t>
             </a:fld>
             <a:endParaRPr lang="en-US"/>
           </a:p>
@@ -1097,7 +1106,7 @@
           <a:p>
             <a:fld id="{C1FF6DA9-008F-8B48-92A6-B652298478BF}" type="slidenum">
               <a:rPr lang="en-US" smtClean="0"/>
-              <a:t>‹#›</a:t>
+              <a:t>‹nº›</a:t>
             </a:fld>
             <a:endParaRPr lang="en-US"/>
           </a:p>
@@ -1149,10 +1158,9 @@
           <a:lstStyle/>
           <a:p>
             <a:r>
-              <a:rPr lang="en-US" smtClean="0"/>
+              <a:rPr lang="en-US"/>
               <a:t>Click to edit Master title style</a:t>
             </a:r>
-            <a:endParaRPr lang="en-US"/>
           </a:p>
         </p:txBody>
       </p:sp>
@@ -1206,38 +1214,37 @@
           <a:p>
             <a:pPr lvl="0"/>
             <a:r>
-              <a:rPr lang="en-US" smtClean="0"/>
+              <a:rPr lang="en-US"/>
               <a:t>Click to edit Master text styles</a:t>
             </a:r>
           </a:p>
           <a:p>
             <a:pPr lvl="1"/>
             <a:r>
-              <a:rPr lang="en-US" smtClean="0"/>
+              <a:rPr lang="en-US"/>
               <a:t>Second level</a:t>
             </a:r>
           </a:p>
           <a:p>
             <a:pPr lvl="2"/>
             <a:r>
-              <a:rPr lang="en-US" smtClean="0"/>
+              <a:rPr lang="en-US"/>
               <a:t>Third level</a:t>
             </a:r>
           </a:p>
           <a:p>
             <a:pPr lvl="3"/>
             <a:r>
-              <a:rPr lang="en-US" smtClean="0"/>
+              <a:rPr lang="en-US"/>
               <a:t>Fourth level</a:t>
             </a:r>
           </a:p>
           <a:p>
             <a:pPr lvl="4"/>
             <a:r>
-              <a:rPr lang="en-US" smtClean="0"/>
+              <a:rPr lang="en-US"/>
               <a:t>Fifth level</a:t>
             </a:r>
-            <a:endParaRPr lang="en-US"/>
           </a:p>
         </p:txBody>
       </p:sp>
@@ -1291,38 +1298,37 @@
           <a:p>
             <a:pPr lvl="0"/>
             <a:r>
-              <a:rPr lang="en-US" smtClean="0"/>
+              <a:rPr lang="en-US"/>
               <a:t>Click to edit Master text styles</a:t>
             </a:r>
           </a:p>
           <a:p>
             <a:pPr lvl="1"/>
             <a:r>
-              <a:rPr lang="en-US" smtClean="0"/>
+              <a:rPr lang="en-US"/>
               <a:t>Second level</a:t>
             </a:r>
           </a:p>
           <a:p>
             <a:pPr lvl="2"/>
             <a:r>
-              <a:rPr lang="en-US" smtClean="0"/>
+              <a:rPr lang="en-US"/>
               <a:t>Third level</a:t>
             </a:r>
           </a:p>
           <a:p>
             <a:pPr lvl="3"/>
             <a:r>
-              <a:rPr lang="en-US" smtClean="0"/>
+              <a:rPr lang="en-US"/>
               <a:t>Fourth level</a:t>
             </a:r>
           </a:p>
           <a:p>
             <a:pPr lvl="4"/>
             <a:r>
-              <a:rPr lang="en-US" smtClean="0"/>
+              <a:rPr lang="en-US"/>
               <a:t>Fifth level</a:t>
             </a:r>
-            <a:endParaRPr lang="en-US"/>
           </a:p>
         </p:txBody>
       </p:sp>
@@ -1343,7 +1349,7 @@
           <a:p>
             <a:fld id="{5BCAD085-E8A6-8845-BD4E-CB4CCA059FC4}" type="datetimeFigureOut">
               <a:rPr lang="en-US" smtClean="0"/>
-              <a:t>1/27/13</a:t>
+              <a:t>1/24/2026</a:t>
             </a:fld>
             <a:endParaRPr lang="en-US"/>
           </a:p>
@@ -1385,7 +1391,7 @@
           <a:p>
             <a:fld id="{C1FF6DA9-008F-8B48-92A6-B652298478BF}" type="slidenum">
               <a:rPr lang="en-US" smtClean="0"/>
-              <a:t>‹#›</a:t>
+              <a:t>‹nº›</a:t>
             </a:fld>
             <a:endParaRPr lang="en-US"/>
           </a:p>
@@ -1441,10 +1447,9 @@
           </a:lstStyle>
           <a:p>
             <a:r>
-              <a:rPr lang="en-US" smtClean="0"/>
+              <a:rPr lang="en-US"/>
               <a:t>Click to edit Master title style</a:t>
             </a:r>
-            <a:endParaRPr lang="en-US"/>
           </a:p>
         </p:txBody>
       </p:sp>
@@ -1507,7 +1512,7 @@
           <a:p>
             <a:pPr lvl="0"/>
             <a:r>
-              <a:rPr lang="en-US" smtClean="0"/>
+              <a:rPr lang="en-US"/>
               <a:t>Click to edit Master text styles</a:t>
             </a:r>
           </a:p>
@@ -1563,38 +1568,37 @@
           <a:p>
             <a:pPr lvl="0"/>
             <a:r>
-              <a:rPr lang="en-US" smtClean="0"/>
+              <a:rPr lang="en-US"/>
               <a:t>Click to edit Master text styles</a:t>
             </a:r>
           </a:p>
           <a:p>
             <a:pPr lvl="1"/>
             <a:r>
-              <a:rPr lang="en-US" smtClean="0"/>
+              <a:rPr lang="en-US"/>
               <a:t>Second level</a:t>
             </a:r>
           </a:p>
           <a:p>
             <a:pPr lvl="2"/>
             <a:r>
-              <a:rPr lang="en-US" smtClean="0"/>
+              <a:rPr lang="en-US"/>
               <a:t>Third level</a:t>
             </a:r>
           </a:p>
           <a:p>
             <a:pPr lvl="3"/>
             <a:r>
-              <a:rPr lang="en-US" smtClean="0"/>
+              <a:rPr lang="en-US"/>
               <a:t>Fourth level</a:t>
             </a:r>
           </a:p>
           <a:p>
             <a:pPr lvl="4"/>
             <a:r>
-              <a:rPr lang="en-US" smtClean="0"/>
+              <a:rPr lang="en-US"/>
               <a:t>Fifth level</a:t>
             </a:r>
-            <a:endParaRPr lang="en-US"/>
           </a:p>
         </p:txBody>
       </p:sp>
@@ -1657,7 +1661,7 @@
           <a:p>
             <a:pPr lvl="0"/>
             <a:r>
-              <a:rPr lang="en-US" smtClean="0"/>
+              <a:rPr lang="en-US"/>
               <a:t>Click to edit Master text styles</a:t>
             </a:r>
           </a:p>
@@ -1713,38 +1717,37 @@
           <a:p>
             <a:pPr lvl="0"/>
             <a:r>
-              <a:rPr lang="en-US" smtClean="0"/>
+              <a:rPr lang="en-US"/>
               <a:t>Click to edit Master text styles</a:t>
             </a:r>
           </a:p>
           <a:p>
             <a:pPr lvl="1"/>
             <a:r>
-              <a:rPr lang="en-US" smtClean="0"/>
+              <a:rPr lang="en-US"/>
               <a:t>Second level</a:t>
             </a:r>
           </a:p>
           <a:p>
             <a:pPr lvl="2"/>
             <a:r>
-              <a:rPr lang="en-US" smtClean="0"/>
+              <a:rPr lang="en-US"/>
               <a:t>Third level</a:t>
             </a:r>
           </a:p>
           <a:p>
             <a:pPr lvl="3"/>
             <a:r>
-              <a:rPr lang="en-US" smtClean="0"/>
+              <a:rPr lang="en-US"/>
               <a:t>Fourth level</a:t>
             </a:r>
           </a:p>
           <a:p>
             <a:pPr lvl="4"/>
             <a:r>
-              <a:rPr lang="en-US" smtClean="0"/>
+              <a:rPr lang="en-US"/>
               <a:t>Fifth level</a:t>
             </a:r>
-            <a:endParaRPr lang="en-US"/>
           </a:p>
         </p:txBody>
       </p:sp>
@@ -1765,7 +1768,7 @@
           <a:p>
             <a:fld id="{5BCAD085-E8A6-8845-BD4E-CB4CCA059FC4}" type="datetimeFigureOut">
               <a:rPr lang="en-US" smtClean="0"/>
-              <a:t>1/27/13</a:t>
+              <a:t>1/24/2026</a:t>
             </a:fld>
             <a:endParaRPr lang="en-US"/>
           </a:p>
@@ -1807,7 +1810,7 @@
           <a:p>
             <a:fld id="{C1FF6DA9-008F-8B48-92A6-B652298478BF}" type="slidenum">
               <a:rPr lang="en-US" smtClean="0"/>
-              <a:t>‹#›</a:t>
+              <a:t>‹nº›</a:t>
             </a:fld>
             <a:endParaRPr lang="en-US"/>
           </a:p>
@@ -1859,10 +1862,9 @@
           <a:lstStyle/>
           <a:p>
             <a:r>
-              <a:rPr lang="en-US" smtClean="0"/>
+              <a:rPr lang="en-US"/>
               <a:t>Click to edit Master title style</a:t>
             </a:r>
-            <a:endParaRPr lang="en-US"/>
           </a:p>
         </p:txBody>
       </p:sp>
@@ -1883,7 +1885,7 @@
           <a:p>
             <a:fld id="{5BCAD085-E8A6-8845-BD4E-CB4CCA059FC4}" type="datetimeFigureOut">
               <a:rPr lang="en-US" smtClean="0"/>
-              <a:t>1/27/13</a:t>
+              <a:t>1/24/2026</a:t>
             </a:fld>
             <a:endParaRPr lang="en-US"/>
           </a:p>
@@ -1925,7 +1927,7 @@
           <a:p>
             <a:fld id="{C1FF6DA9-008F-8B48-92A6-B652298478BF}" type="slidenum">
               <a:rPr lang="en-US" smtClean="0"/>
-              <a:t>‹#›</a:t>
+              <a:t>‹nº›</a:t>
             </a:fld>
             <a:endParaRPr lang="en-US"/>
           </a:p>
@@ -1978,7 +1980,7 @@
           <a:p>
             <a:fld id="{5BCAD085-E8A6-8845-BD4E-CB4CCA059FC4}" type="datetimeFigureOut">
               <a:rPr lang="en-US" smtClean="0"/>
-              <a:t>1/27/13</a:t>
+              <a:t>1/24/2026</a:t>
             </a:fld>
             <a:endParaRPr lang="en-US"/>
           </a:p>
@@ -2020,7 +2022,7 @@
           <a:p>
             <a:fld id="{C1FF6DA9-008F-8B48-92A6-B652298478BF}" type="slidenum">
               <a:rPr lang="en-US" smtClean="0"/>
-              <a:t>‹#›</a:t>
+              <a:t>‹nº›</a:t>
             </a:fld>
             <a:endParaRPr lang="en-US"/>
           </a:p>
@@ -2081,10 +2083,9 @@
           </a:lstStyle>
           <a:p>
             <a:r>
-              <a:rPr lang="en-US" smtClean="0"/>
+              <a:rPr lang="en-US"/>
               <a:t>Click to edit Master title style</a:t>
             </a:r>
-            <a:endParaRPr lang="en-US"/>
           </a:p>
         </p:txBody>
       </p:sp>
@@ -2138,38 +2139,37 @@
           <a:p>
             <a:pPr lvl="0"/>
             <a:r>
-              <a:rPr lang="en-US" smtClean="0"/>
+              <a:rPr lang="en-US"/>
               <a:t>Click to edit Master text styles</a:t>
             </a:r>
           </a:p>
           <a:p>
             <a:pPr lvl="1"/>
             <a:r>
-              <a:rPr lang="en-US" smtClean="0"/>
+              <a:rPr lang="en-US"/>
               <a:t>Second level</a:t>
             </a:r>
           </a:p>
           <a:p>
             <a:pPr lvl="2"/>
             <a:r>
-              <a:rPr lang="en-US" smtClean="0"/>
+              <a:rPr lang="en-US"/>
               <a:t>Third level</a:t>
             </a:r>
           </a:p>
           <a:p>
             <a:pPr lvl="3"/>
             <a:r>
-              <a:rPr lang="en-US" smtClean="0"/>
+              <a:rPr lang="en-US"/>
               <a:t>Fourth level</a:t>
             </a:r>
           </a:p>
           <a:p>
             <a:pPr lvl="4"/>
             <a:r>
-              <a:rPr lang="en-US" smtClean="0"/>
+              <a:rPr lang="en-US"/>
               <a:t>Fifth level</a:t>
             </a:r>
-            <a:endParaRPr lang="en-US"/>
           </a:p>
         </p:txBody>
       </p:sp>
@@ -2232,7 +2232,7 @@
           <a:p>
             <a:pPr lvl="0"/>
             <a:r>
-              <a:rPr lang="en-US" smtClean="0"/>
+              <a:rPr lang="en-US"/>
               <a:t>Click to edit Master text styles</a:t>
             </a:r>
           </a:p>
@@ -2255,7 +2255,7 @@
           <a:p>
             <a:fld id="{5BCAD085-E8A6-8845-BD4E-CB4CCA059FC4}" type="datetimeFigureOut">
               <a:rPr lang="en-US" smtClean="0"/>
-              <a:t>1/27/13</a:t>
+              <a:t>1/24/2026</a:t>
             </a:fld>
             <a:endParaRPr lang="en-US"/>
           </a:p>
@@ -2297,7 +2297,7 @@
           <a:p>
             <a:fld id="{C1FF6DA9-008F-8B48-92A6-B652298478BF}" type="slidenum">
               <a:rPr lang="en-US" smtClean="0"/>
-              <a:t>‹#›</a:t>
+              <a:t>‹nº›</a:t>
             </a:fld>
             <a:endParaRPr lang="en-US"/>
           </a:p>
@@ -2358,10 +2358,9 @@
           </a:lstStyle>
           <a:p>
             <a:r>
-              <a:rPr lang="en-US" smtClean="0"/>
+              <a:rPr lang="en-US"/>
               <a:t>Click to edit Master title style</a:t>
             </a:r>
-            <a:endParaRPr lang="en-US"/>
           </a:p>
         </p:txBody>
       </p:sp>
@@ -2485,7 +2484,7 @@
           <a:p>
             <a:pPr lvl="0"/>
             <a:r>
-              <a:rPr lang="en-US" smtClean="0"/>
+              <a:rPr lang="en-US"/>
               <a:t>Click to edit Master text styles</a:t>
             </a:r>
           </a:p>
@@ -2508,7 +2507,7 @@
           <a:p>
             <a:fld id="{5BCAD085-E8A6-8845-BD4E-CB4CCA059FC4}" type="datetimeFigureOut">
               <a:rPr lang="en-US" smtClean="0"/>
-              <a:t>1/27/13</a:t>
+              <a:t>1/24/2026</a:t>
             </a:fld>
             <a:endParaRPr lang="en-US"/>
           </a:p>
@@ -2550,7 +2549,7 @@
           <a:p>
             <a:fld id="{C1FF6DA9-008F-8B48-92A6-B652298478BF}" type="slidenum">
               <a:rPr lang="en-US" smtClean="0"/>
-              <a:t>‹#›</a:t>
+              <a:t>‹nº›</a:t>
             </a:fld>
             <a:endParaRPr lang="en-US"/>
           </a:p>
@@ -2617,10 +2616,9 @@
           <a:lstStyle/>
           <a:p>
             <a:r>
-              <a:rPr lang="en-US" smtClean="0"/>
+              <a:rPr lang="en-US"/>
               <a:t>Click to edit Master title style</a:t>
             </a:r>
-            <a:endParaRPr lang="en-US"/>
           </a:p>
         </p:txBody>
       </p:sp>
@@ -2651,38 +2649,37 @@
           <a:p>
             <a:pPr lvl="0"/>
             <a:r>
-              <a:rPr lang="en-US" smtClean="0"/>
+              <a:rPr lang="en-US"/>
               <a:t>Click to edit Master text styles</a:t>
             </a:r>
           </a:p>
           <a:p>
             <a:pPr lvl="1"/>
             <a:r>
-              <a:rPr lang="en-US" smtClean="0"/>
+              <a:rPr lang="en-US"/>
               <a:t>Second level</a:t>
             </a:r>
           </a:p>
           <a:p>
             <a:pPr lvl="2"/>
             <a:r>
-              <a:rPr lang="en-US" smtClean="0"/>
+              <a:rPr lang="en-US"/>
               <a:t>Third level</a:t>
             </a:r>
           </a:p>
           <a:p>
             <a:pPr lvl="3"/>
             <a:r>
-              <a:rPr lang="en-US" smtClean="0"/>
+              <a:rPr lang="en-US"/>
               <a:t>Fourth level</a:t>
             </a:r>
           </a:p>
           <a:p>
             <a:pPr lvl="4"/>
             <a:r>
-              <a:rPr lang="en-US" smtClean="0"/>
+              <a:rPr lang="en-US"/>
               <a:t>Fifth level</a:t>
             </a:r>
-            <a:endParaRPr lang="en-US"/>
           </a:p>
         </p:txBody>
       </p:sp>
@@ -2721,7 +2718,7 @@
           <a:p>
             <a:fld id="{5BCAD085-E8A6-8845-BD4E-CB4CCA059FC4}" type="datetimeFigureOut">
               <a:rPr lang="en-US" smtClean="0"/>
-              <a:t>1/27/13</a:t>
+              <a:t>1/24/2026</a:t>
             </a:fld>
             <a:endParaRPr lang="en-US"/>
           </a:p>
@@ -2799,7 +2796,7 @@
           <a:p>
             <a:fld id="{C1FF6DA9-008F-8B48-92A6-B652298478BF}" type="slidenum">
               <a:rPr lang="en-US" smtClean="0"/>
-              <a:t>‹#›</a:t>
+              <a:t>‹nº›</a:t>
             </a:fld>
             <a:endParaRPr lang="en-US"/>
           </a:p>
@@ -3080,7 +3077,7 @@
 </file>
 
 <file path=ppt/slides/slide1.xml><?xml version="1.0" encoding="utf-8"?>
-<p:sld xmlns:a="http://schemas.openxmlformats.org/drawingml/2006/main" xmlns:p="http://schemas.openxmlformats.org/presentationml/2006/main" xmlns:r="http://schemas.openxmlformats.org/officeDocument/2006/relationships">
+<p:sld xmlns:a="http://schemas.openxmlformats.org/drawingml/2006/main" xmlns:r="http://schemas.openxmlformats.org/officeDocument/2006/relationships" xmlns:p="http://schemas.openxmlformats.org/presentationml/2006/main">
   <p:cSld>
     <p:spTree>
       <p:nvGrpSpPr>
@@ -3088,7 +3085,14 @@
         <p:cNvGrpSpPr/>
         <p:nvPr/>
       </p:nvGrpSpPr>
-      <p:grpSpPr/>
+      <p:grpSpPr>
+        <a:xfrm>
+          <a:off x="0" y="0"/>
+          <a:ext cx="0" cy="0"/>
+          <a:chOff x="0" y="0"/>
+          <a:chExt cx="0" cy="0"/>
+        </a:xfrm>
+      </p:grpSpPr>
       <p:sp>
         <p:nvSpPr>
           <p:cNvPr id="2" name="Title 1"/>
@@ -3140,7 +3144,7 @@
 </file>
 
 <file path=ppt/slides/slide2.xml><?xml version="1.0" encoding="utf-8"?>
-<p:sld xmlns:a="http://schemas.openxmlformats.org/drawingml/2006/main" xmlns:p="http://schemas.openxmlformats.org/presentationml/2006/main" xmlns:r="http://schemas.openxmlformats.org/officeDocument/2006/relationships">
+<p:sld xmlns:a="http://schemas.openxmlformats.org/drawingml/2006/main" xmlns:r="http://schemas.openxmlformats.org/officeDocument/2006/relationships" xmlns:p="http://schemas.openxmlformats.org/presentationml/2006/main">
   <p:cSld>
     <p:spTree>
       <p:nvGrpSpPr>
@@ -3148,7 +3152,14 @@
         <p:cNvGrpSpPr/>
         <p:nvPr/>
       </p:nvGrpSpPr>
-      <p:grpSpPr/>
+      <p:grpSpPr>
+        <a:xfrm>
+          <a:off x="0" y="0"/>
+          <a:ext cx="0" cy="0"/>
+          <a:chOff x="0" y="0"/>
+          <a:chExt cx="0" cy="0"/>
+        </a:xfrm>
+      </p:grpSpPr>
       <p:sp>
         <p:nvSpPr>
           <p:cNvPr id="2" name="Title 1"/>
@@ -3184,7 +3195,9 @@
         <p:txBody>
           <a:bodyPr/>
           <a:lstStyle/>
-          <a:p/>
+          <a:p>
+            <a:endParaRPr/>
+          </a:p>
           <a:p>
             <a:pPr>
               <a:defRPr sz="2400"/>
@@ -3207,6 +3220,159 @@
             </a:pPr>
             <a:r>
               <a:t>Risk Level: {{ risk_score | format_logic('10=LOW (Green)', '20=MED (Yellow)', '30=HIGH (Red)', 'default', 'UNRATED') }}</a:t>
+            </a:r>
+          </a:p>
+        </p:txBody>
+      </p:sp>
+    </p:spTree>
+  </p:cSld>
+  <p:clrMapOvr>
+    <a:masterClrMapping/>
+  </p:clrMapOvr>
+</p:sld>
+</file>
+
+<file path=ppt/slides/slide3.xml><?xml version="1.0" encoding="utf-8"?>
+<p:sld xmlns:a="http://schemas.openxmlformats.org/drawingml/2006/main" xmlns:r="http://schemas.openxmlformats.org/officeDocument/2006/relationships" xmlns:p="http://schemas.openxmlformats.org/presentationml/2006/main">
+  <p:cSld>
+    <p:spTree>
+      <p:nvGrpSpPr>
+        <p:cNvPr id="1" name=""/>
+        <p:cNvGrpSpPr/>
+        <p:nvPr/>
+      </p:nvGrpSpPr>
+      <p:grpSpPr>
+        <a:xfrm>
+          <a:off x="0" y="0"/>
+          <a:ext cx="0" cy="0"/>
+          <a:chOff x="0" y="0"/>
+          <a:chExt cx="0" cy="0"/>
+        </a:xfrm>
+      </p:grpSpPr>
+      <p:sp>
+        <p:nvSpPr>
+          <p:cNvPr id="2" name="Title 1"/>
+          <p:cNvSpPr>
+            <a:spLocks noGrp="1"/>
+          </p:cNvSpPr>
+          <p:nvPr>
+            <p:ph type="title"/>
+          </p:nvPr>
+        </p:nvSpPr>
+        <p:spPr/>
+        <p:txBody>
+          <a:bodyPr/>
+          <a:lstStyle/>
+          <a:p>
+            <a:r>
+              <a:rPr dirty="0"/>
+              <a:t>Text &amp; Logic Tests</a:t>
+            </a:r>
+          </a:p>
+        </p:txBody>
+      </p:sp>
+      <p:sp>
+        <p:nvSpPr>
+          <p:cNvPr id="3" name="Content Placeholder 2"/>
+          <p:cNvSpPr>
+            <a:spLocks noGrp="1"/>
+          </p:cNvSpPr>
+          <p:nvPr>
+            <p:ph idx="1"/>
+          </p:nvPr>
+        </p:nvSpPr>
+        <p:spPr/>
+        <p:txBody>
+          <a:bodyPr/>
+          <a:lstStyle/>
+          <a:p>
+            <a:r>
+              <a:t>Company: {{ company | format_string('upper') }}</a:t>
+            </a:r>
+          </a:p>
+          <a:p>
+            <a:r>
+              <a:t>Masked Email: {{ email_contact | format_mask('email') }}</a:t>
+            </a:r>
+          </a:p>
+          <a:p>
+            <a:r>
+              <a:t>Masked Card: {{ card_token | format_mask('credit_card') }}</a:t>
+            </a:r>
+          </a:p>
+        </p:txBody>
+      </p:sp>
+    </p:spTree>
+  </p:cSld>
+  <p:clrMapOvr>
+    <a:masterClrMapping/>
+  </p:clrMapOvr>
+</p:sld>
+</file>
+
+<file path=ppt/slides/slide4.xml><?xml version="1.0" encoding="utf-8"?>
+<p:sld xmlns:a="http://schemas.openxmlformats.org/drawingml/2006/main" xmlns:r="http://schemas.openxmlformats.org/officeDocument/2006/relationships" xmlns:p="http://schemas.openxmlformats.org/presentationml/2006/main">
+  <p:cSld>
+    <p:spTree>
+      <p:nvGrpSpPr>
+        <p:cNvPr id="1" name=""/>
+        <p:cNvGrpSpPr/>
+        <p:nvPr/>
+      </p:nvGrpSpPr>
+      <p:grpSpPr>
+        <a:xfrm>
+          <a:off x="0" y="0"/>
+          <a:ext cx="0" cy="0"/>
+          <a:chOff x="0" y="0"/>
+          <a:chExt cx="0" cy="0"/>
+        </a:xfrm>
+      </p:grpSpPr>
+      <p:sp>
+        <p:nvSpPr>
+          <p:cNvPr id="2" name="Title 1"/>
+          <p:cNvSpPr>
+            <a:spLocks noGrp="1"/>
+          </p:cNvSpPr>
+          <p:nvPr>
+            <p:ph type="title"/>
+          </p:nvPr>
+        </p:nvSpPr>
+        <p:spPr/>
+        <p:txBody>
+          <a:bodyPr/>
+          <a:lstStyle/>
+          <a:p>
+            <a:r>
+              <a:t>Boolean Visuals</a:t>
+            </a:r>
+          </a:p>
+        </p:txBody>
+      </p:sp>
+      <p:sp>
+        <p:nvSpPr>
+          <p:cNvPr id="3" name="Content Placeholder 2"/>
+          <p:cNvSpPr>
+            <a:spLocks noGrp="1"/>
+          </p:cNvSpPr>
+          <p:nvPr>
+            <p:ph idx="1"/>
+          </p:nvPr>
+        </p:nvSpPr>
+        <p:spPr/>
+        <p:txBody>
+          <a:bodyPr/>
+          <a:lstStyle/>
+          <a:p>
+            <a:endParaRPr/>
+          </a:p>
+          <a:p>
+            <a:r>
+              <a:t>Is Public? {{ is_public | format_bool('check') }}</a:t>
+            </a:r>
+          </a:p>
+          <a:p>
+            <a:r>
+              <a:t>Compliance? [ {{ compliance_check | format_bool('check') }} ]</a:t>
             </a:r>
           </a:p>
         </p:txBody>

</xml_diff>